<commit_message>
separate project or the same
</commit_message>
<xml_diff>
--- a/faq.pptx
+++ b/faq.pptx
@@ -6,7 +6,7 @@
     <p:sldMasterId id="2147483812" r:id="rId2"/>
   </p:sldMasterIdLst>
   <p:notesMasterIdLst>
-    <p:notesMasterId r:id="rId16"/>
+    <p:notesMasterId r:id="rId17"/>
   </p:notesMasterIdLst>
   <p:sldIdLst>
     <p:sldId id="362" r:id="rId3"/>
@@ -17,13 +17,14 @@
     <p:sldId id="352" r:id="rId8"/>
     <p:sldId id="363" r:id="rId9"/>
     <p:sldId id="364" r:id="rId10"/>
-    <p:sldId id="365" r:id="rId11"/>
-    <p:sldId id="366" r:id="rId12"/>
-    <p:sldId id="367" r:id="rId13"/>
-    <p:sldId id="369" r:id="rId14"/>
-    <p:sldId id="368" r:id="rId15"/>
+    <p:sldId id="370" r:id="rId11"/>
+    <p:sldId id="365" r:id="rId12"/>
+    <p:sldId id="366" r:id="rId13"/>
+    <p:sldId id="367" r:id="rId14"/>
+    <p:sldId id="369" r:id="rId15"/>
+    <p:sldId id="368" r:id="rId16"/>
   </p:sldIdLst>
-  <p:sldSz cx="9144000" cy="6858000" type="screen4x3"/>
+  <p:sldSz cx="12192000" cy="6858000"/>
   <p:notesSz cx="6858000" cy="9144000"/>
   <p:defaultTextStyle>
     <a:defPPr>
@@ -128,7 +129,7 @@
             <a:srgbClr val="A4A3A4"/>
           </p15:clr>
         </p15:guide>
-        <p15:guide id="2" pos="2880" userDrawn="1">
+        <p15:guide id="2" pos="3840" userDrawn="1">
           <p15:clr>
             <a:srgbClr val="A4A3A4"/>
           </p15:clr>
@@ -2793,7 +2794,7 @@
       </dsp:nvSpPr>
       <dsp:spPr>
         <a:xfrm>
-          <a:off x="1364123" y="210303"/>
+          <a:off x="1748174" y="210303"/>
           <a:ext cx="175586" cy="38914"/>
         </a:xfrm>
         <a:prstGeom prst="rect">
@@ -2841,7 +2842,7 @@
         </a:p>
       </dsp:txBody>
       <dsp:txXfrm>
-        <a:off x="1364123" y="210303"/>
+        <a:off x="1748174" y="210303"/>
         <a:ext cx="175586" cy="38914"/>
       </dsp:txXfrm>
     </dsp:sp>
@@ -2909,6 +2910,117 @@
       <dsp:cNvGrpSpPr/>
     </dsp:nvGrpSpPr>
     <dsp:grpSpPr/>
+    <dsp:sp modelId="{B29ABF60-EC0F-45AD-A90E-9C76D15C2F14}">
+      <dsp:nvSpPr>
+        <dsp:cNvPr id="0" name=""/>
+        <dsp:cNvSpPr/>
+      </dsp:nvSpPr>
+      <dsp:spPr>
+        <a:xfrm>
+          <a:off x="1748174" y="210303"/>
+          <a:ext cx="175586" cy="38914"/>
+        </a:xfrm>
+        <a:prstGeom prst="rect">
+          <a:avLst/>
+        </a:prstGeom>
+        <a:noFill/>
+        <a:ln>
+          <a:noFill/>
+        </a:ln>
+        <a:effectLst/>
+      </dsp:spPr>
+      <dsp:style>
+        <a:lnRef idx="0">
+          <a:scrgbClr r="0" g="0" b="0"/>
+        </a:lnRef>
+        <a:fillRef idx="0">
+          <a:scrgbClr r="0" g="0" b="0"/>
+        </a:fillRef>
+        <a:effectRef idx="0">
+          <a:scrgbClr r="0" g="0" b="0"/>
+        </a:effectRef>
+        <a:fontRef idx="minor"/>
+      </dsp:style>
+      <dsp:txBody>
+        <a:bodyPr spcFirstLastPara="0" vert="horz" wrap="square" lIns="0" tIns="19050" rIns="19050" bIns="0" numCol="1" spcCol="1270" anchor="t" anchorCtr="0">
+          <a:noAutofit/>
+        </a:bodyPr>
+        <a:lstStyle/>
+        <a:p>
+          <a:pPr lvl="0" algn="l" defTabSz="222250">
+            <a:lnSpc>
+              <a:spcPct val="90000"/>
+            </a:lnSpc>
+            <a:spcBef>
+              <a:spcPct val="0"/>
+            </a:spcBef>
+            <a:spcAft>
+              <a:spcPct val="35000"/>
+            </a:spcAft>
+          </a:pPr>
+          <a:r>
+            <a:rPr lang="ru-RU" sz="500" kern="1200" dirty="0"/>
+            <a:t> </a:t>
+          </a:r>
+        </a:p>
+      </dsp:txBody>
+      <dsp:txXfrm>
+        <a:off x="1748174" y="210303"/>
+        <a:ext cx="175586" cy="38914"/>
+      </dsp:txXfrm>
+    </dsp:sp>
+    <dsp:sp modelId="{61EB78D8-69FF-471D-8FEB-71388C442F55}">
+      <dsp:nvSpPr>
+        <dsp:cNvPr id="0" name=""/>
+        <dsp:cNvSpPr/>
+      </dsp:nvSpPr>
+      <dsp:spPr>
+        <a:xfrm>
+          <a:off x="0" y="0"/>
+          <a:ext cx="1980001" cy="381600"/>
+        </a:xfrm>
+        <a:prstGeom prst="rect">
+          <a:avLst/>
+        </a:prstGeom>
+        <a:blipFill>
+          <a:blip xmlns:r="http://schemas.openxmlformats.org/officeDocument/2006/relationships" r:embed="rId1">
+            <a:extLst>
+              <a:ext uri="{28A0092B-C50C-407E-A947-70E740481C1C}">
+                <a14:useLocalDpi xmlns:a14="http://schemas.microsoft.com/office/drawing/2010/main" val="0"/>
+              </a:ext>
+            </a:extLst>
+          </a:blip>
+          <a:srcRect/>
+          <a:stretch>
+            <a:fillRect l="-1000" r="-1000"/>
+          </a:stretch>
+        </a:blipFill>
+        <a:ln w="25400" cap="flat" cmpd="sng" algn="ctr">
+          <a:solidFill>
+            <a:schemeClr val="lt1">
+              <a:hueOff val="0"/>
+              <a:satOff val="0"/>
+              <a:lumOff val="0"/>
+              <a:alphaOff val="0"/>
+            </a:schemeClr>
+          </a:solidFill>
+          <a:prstDash val="solid"/>
+        </a:ln>
+        <a:effectLst/>
+      </dsp:spPr>
+      <dsp:style>
+        <a:lnRef idx="2">
+          <a:scrgbClr r="0" g="0" b="0"/>
+        </a:lnRef>
+        <a:fillRef idx="1">
+          <a:scrgbClr r="0" g="0" b="0"/>
+        </a:fillRef>
+        <a:effectRef idx="0">
+          <a:scrgbClr r="0" g="0" b="0"/>
+        </a:effectRef>
+        <a:fontRef idx="minor"/>
+      </dsp:style>
+    </dsp:sp>
   </dsp:spTree>
 </dsp:drawing>
 </file>
@@ -2921,6 +3033,127 @@
       <dsp:cNvGrpSpPr/>
     </dsp:nvGrpSpPr>
     <dsp:grpSpPr/>
+    <dsp:sp modelId="{A30F2283-C0A4-4A69-BCBE-833D967155A2}">
+      <dsp:nvSpPr>
+        <dsp:cNvPr id="0" name=""/>
+        <dsp:cNvSpPr/>
+      </dsp:nvSpPr>
+      <dsp:spPr>
+        <a:xfrm>
+          <a:off x="469735" y="1146225"/>
+          <a:ext cx="2927097" cy="509149"/>
+        </a:xfrm>
+        <a:prstGeom prst="rect">
+          <a:avLst/>
+        </a:prstGeom>
+        <a:noFill/>
+        <a:ln>
+          <a:noFill/>
+        </a:ln>
+        <a:effectLst/>
+      </dsp:spPr>
+      <dsp:style>
+        <a:lnRef idx="0">
+          <a:scrgbClr r="0" g="0" b="0"/>
+        </a:lnRef>
+        <a:fillRef idx="0">
+          <a:scrgbClr r="0" g="0" b="0"/>
+        </a:fillRef>
+        <a:effectRef idx="0">
+          <a:scrgbClr r="0" g="0" b="0"/>
+        </a:effectRef>
+        <a:fontRef idx="minor"/>
+      </dsp:style>
+      <dsp:txBody>
+        <a:bodyPr spcFirstLastPara="0" vert="horz" wrap="square" lIns="0" tIns="152400" rIns="152400" bIns="0" numCol="1" spcCol="1270" anchor="b" anchorCtr="0">
+          <a:noAutofit/>
+        </a:bodyPr>
+        <a:lstStyle/>
+        <a:p>
+          <a:pPr lvl="0" algn="ctr" defTabSz="1778000">
+            <a:lnSpc>
+              <a:spcPct val="90000"/>
+            </a:lnSpc>
+            <a:spcBef>
+              <a:spcPct val="0"/>
+            </a:spcBef>
+            <a:spcAft>
+              <a:spcPct val="35000"/>
+            </a:spcAft>
+          </a:pPr>
+          <a:r>
+            <a:rPr lang="ru-RU" sz="4000" kern="1200" dirty="0">
+              <a:solidFill>
+                <a:schemeClr val="accent1"/>
+              </a:solidFill>
+            </a:rPr>
+            <a:t>ВОПРОСЫ</a:t>
+          </a:r>
+          <a:r>
+            <a:rPr lang="en-US" sz="4000" kern="1200" dirty="0">
+              <a:solidFill>
+                <a:schemeClr val="accent1"/>
+              </a:solidFill>
+            </a:rPr>
+            <a:t>?</a:t>
+          </a:r>
+          <a:endParaRPr lang="ru-RU" sz="4000" kern="1200" dirty="0">
+            <a:solidFill>
+              <a:schemeClr val="accent1"/>
+            </a:solidFill>
+          </a:endParaRPr>
+        </a:p>
+      </dsp:txBody>
+      <dsp:txXfrm>
+        <a:off x="469735" y="1146225"/>
+        <a:ext cx="2927097" cy="509149"/>
+      </dsp:txXfrm>
+    </dsp:sp>
+    <dsp:sp modelId="{DFDA3CA3-5C68-4A2F-A4A8-285063A35D87}">
+      <dsp:nvSpPr>
+        <dsp:cNvPr id="0" name=""/>
+        <dsp:cNvSpPr/>
+      </dsp:nvSpPr>
+      <dsp:spPr>
+        <a:xfrm>
+          <a:off x="1521700" y="91137"/>
+          <a:ext cx="849599" cy="849599"/>
+        </a:xfrm>
+        <a:prstGeom prst="rect">
+          <a:avLst/>
+        </a:prstGeom>
+        <a:blipFill>
+          <a:blip xmlns:r="http://schemas.openxmlformats.org/officeDocument/2006/relationships" r:embed="rId1">
+            <a:extLst>
+              <a:ext uri="{28A0092B-C50C-407E-A947-70E740481C1C}">
+                <a14:useLocalDpi xmlns:a14="http://schemas.microsoft.com/office/drawing/2010/main" val="0"/>
+              </a:ext>
+            </a:extLst>
+          </a:blip>
+          <a:srcRect/>
+          <a:stretch>
+            <a:fillRect/>
+          </a:stretch>
+        </a:blipFill>
+        <a:ln w="0" cap="flat" cmpd="sng" algn="ctr">
+          <a:noFill/>
+          <a:prstDash val="solid"/>
+        </a:ln>
+        <a:effectLst/>
+      </dsp:spPr>
+      <dsp:style>
+        <a:lnRef idx="2">
+          <a:scrgbClr r="0" g="0" b="0"/>
+        </a:lnRef>
+        <a:fillRef idx="1">
+          <a:scrgbClr r="0" g="0" b="0"/>
+        </a:fillRef>
+        <a:effectRef idx="0">
+          <a:scrgbClr r="0" g="0" b="0"/>
+        </a:effectRef>
+        <a:fontRef idx="minor"/>
+      </dsp:style>
+    </dsp:sp>
   </dsp:spTree>
 </dsp:drawing>
 </file>
@@ -6925,8 +7158,8 @@
         </p:nvSpPr>
         <p:spPr>
           <a:xfrm>
-            <a:off x="1143000" y="685800"/>
-            <a:ext cx="4572000" cy="3429000"/>
+            <a:off x="381000" y="685800"/>
+            <a:ext cx="6096000" cy="3429000"/>
           </a:xfrm>
           <a:prstGeom prst="rect">
             <a:avLst/>
@@ -7203,8 +7436,8 @@
         </p:nvSpPr>
         <p:spPr>
           <a:xfrm>
-            <a:off x="1143000" y="685800"/>
-            <a:ext cx="4572000" cy="3429000"/>
+            <a:off x="381000" y="685800"/>
+            <a:ext cx="6096000" cy="3429000"/>
           </a:xfrm>
         </p:spPr>
       </p:sp>
@@ -7292,8 +7525,8 @@
         </p:nvSpPr>
         <p:spPr>
           <a:xfrm>
-            <a:off x="971550" y="549276"/>
-            <a:ext cx="7200900" cy="2879725"/>
+            <a:off x="1295400" y="549277"/>
+            <a:ext cx="9601200" cy="2879725"/>
           </a:xfrm>
         </p:spPr>
         <p:txBody>
@@ -7324,8 +7557,8 @@
         </p:nvSpPr>
         <p:spPr>
           <a:xfrm>
-            <a:off x="971550" y="3429001"/>
-            <a:ext cx="7200900" cy="1800225"/>
+            <a:off x="1295400" y="3429002"/>
+            <a:ext cx="9601200" cy="1800225"/>
           </a:xfrm>
         </p:spPr>
         <p:txBody>
@@ -7389,8 +7622,8 @@
         </p:nvSpPr>
         <p:spPr>
           <a:xfrm>
-            <a:off x="3275857" y="5229273"/>
-            <a:ext cx="4896596" cy="438941"/>
+            <a:off x="4367809" y="5229274"/>
+            <a:ext cx="6528795" cy="438941"/>
           </a:xfrm>
         </p:spPr>
         <p:txBody>
@@ -7425,8 +7658,8 @@
           </p:nvPr>
         </p:nvGraphicFramePr>
         <p:xfrm>
-          <a:off x="971571" y="5221846"/>
-          <a:ext cx="2304305" cy="438965"/>
+          <a:off x="1295429" y="5221847"/>
+          <a:ext cx="3072407" cy="438965"/>
         </p:xfrm>
         <a:graphic>
           <a:graphicData uri="http://schemas.openxmlformats.org/drawingml/2006/diagram">
@@ -7476,8 +7709,8 @@
         </p:nvSpPr>
         <p:spPr>
           <a:xfrm>
-            <a:off x="971550" y="1916113"/>
-            <a:ext cx="7200850" cy="4392612"/>
+            <a:off x="1295400" y="1916113"/>
+            <a:ext cx="9601133" cy="4392612"/>
           </a:xfrm>
         </p:spPr>
         <p:txBody>
@@ -7536,8 +7769,8 @@
         </p:nvSpPr>
         <p:spPr>
           <a:xfrm>
-            <a:off x="971650" y="552147"/>
-            <a:ext cx="7200800" cy="1076628"/>
+            <a:off x="1295533" y="552147"/>
+            <a:ext cx="9601067" cy="1076628"/>
           </a:xfrm>
         </p:spPr>
         <p:txBody>
@@ -7574,8 +7807,8 @@
         </p:nvCxnSpPr>
         <p:spPr>
           <a:xfrm>
-            <a:off x="971601" y="1628775"/>
-            <a:ext cx="7200850" cy="0"/>
+            <a:off x="1295468" y="1628775"/>
+            <a:ext cx="9601133" cy="0"/>
           </a:xfrm>
           <a:prstGeom prst="line">
             <a:avLst/>
@@ -7680,8 +7913,8 @@
         </p:nvSpPr>
         <p:spPr>
           <a:xfrm>
-            <a:off x="971550" y="1628779"/>
-            <a:ext cx="7200850" cy="4679951"/>
+            <a:off x="1295400" y="1628779"/>
+            <a:ext cx="9601133" cy="4679951"/>
           </a:xfrm>
         </p:spPr>
         <p:txBody>
@@ -7769,8 +8002,8 @@
         </p:nvSpPr>
         <p:spPr>
           <a:xfrm>
-            <a:off x="971650" y="1628775"/>
-            <a:ext cx="7200800" cy="3600450"/>
+            <a:off x="1295533" y="1628775"/>
+            <a:ext cx="9601067" cy="3600450"/>
           </a:xfrm>
         </p:spPr>
         <p:txBody>
@@ -7837,7 +8070,7 @@
         <p:spPr>
           <a:xfrm>
             <a:off x="0" y="13184"/>
-            <a:ext cx="9144000" cy="6858000"/>
+            <a:ext cx="12192000" cy="6858000"/>
           </a:xfrm>
         </p:spPr>
         <p:txBody>
@@ -7869,8 +8102,8 @@
         </p:nvSpPr>
         <p:spPr>
           <a:xfrm>
-            <a:off x="971550" y="407600"/>
-            <a:ext cx="8172450" cy="1079500"/>
+            <a:off x="1295400" y="407600"/>
+            <a:ext cx="10896600" cy="1079500"/>
           </a:xfrm>
           <a:solidFill>
             <a:schemeClr val="accent1">
@@ -7909,8 +8142,8 @@
         </p:nvSpPr>
         <p:spPr>
           <a:xfrm>
-            <a:off x="3247" y="499928"/>
-            <a:ext cx="968306" cy="984386"/>
+            <a:off x="4329" y="499928"/>
+            <a:ext cx="1291075" cy="984386"/>
           </a:xfrm>
         </p:spPr>
         <p:txBody>
@@ -7943,7 +8176,7 @@
         <p:spPr>
           <a:xfrm>
             <a:off x="0" y="408262"/>
-            <a:ext cx="971550" cy="1076052"/>
+            <a:ext cx="1295400" cy="1076052"/>
           </a:xfrm>
           <a:solidFill>
             <a:schemeClr val="accent1">
@@ -8031,7 +8264,7 @@
         <p:spPr>
           <a:xfrm>
             <a:off x="0" y="-1304"/>
-            <a:ext cx="9144000" cy="6858000"/>
+            <a:ext cx="12192000" cy="6858000"/>
           </a:xfrm>
         </p:spPr>
         <p:txBody>
@@ -8063,8 +8296,8 @@
         </p:nvSpPr>
         <p:spPr>
           <a:xfrm>
-            <a:off x="971550" y="5376250"/>
-            <a:ext cx="8172450" cy="1076961"/>
+            <a:off x="1295400" y="5376251"/>
+            <a:ext cx="10896600" cy="1076961"/>
           </a:xfrm>
           <a:solidFill>
             <a:schemeClr val="accent1">
@@ -8104,7 +8337,7 @@
         <p:spPr>
           <a:xfrm>
             <a:off x="0" y="5373688"/>
-            <a:ext cx="971550" cy="1076052"/>
+            <a:ext cx="1295400" cy="1076052"/>
           </a:xfrm>
           <a:solidFill>
             <a:schemeClr val="accent1">
@@ -8192,7 +8425,7 @@
         <p:spPr>
           <a:xfrm>
             <a:off x="0" y="-1304"/>
-            <a:ext cx="9144000" cy="6858000"/>
+            <a:ext cx="12192000" cy="6858000"/>
           </a:xfrm>
         </p:spPr>
         <p:txBody>
@@ -8224,8 +8457,8 @@
         </p:nvSpPr>
         <p:spPr>
           <a:xfrm>
-            <a:off x="971550" y="5373216"/>
-            <a:ext cx="8172450" cy="1079972"/>
+            <a:off x="1295400" y="5373216"/>
+            <a:ext cx="10896600" cy="1079972"/>
           </a:xfrm>
           <a:solidFill>
             <a:schemeClr val="accent1">
@@ -8270,7 +8503,7 @@
         <p:spPr>
           <a:xfrm>
             <a:off x="0" y="5373688"/>
-            <a:ext cx="971550" cy="1076052"/>
+            <a:ext cx="1295400" cy="1076052"/>
           </a:xfrm>
           <a:solidFill>
             <a:schemeClr val="accent1">
@@ -8358,7 +8591,7 @@
         <p:spPr>
           <a:xfrm>
             <a:off x="0" y="-1304"/>
-            <a:ext cx="9144000" cy="6858000"/>
+            <a:ext cx="12192000" cy="6858000"/>
           </a:xfrm>
         </p:spPr>
         <p:txBody>
@@ -8446,8 +8679,8 @@
         </p:nvCxnSpPr>
         <p:spPr>
           <a:xfrm>
-            <a:off x="971550" y="1341438"/>
-            <a:ext cx="7200850" cy="0"/>
+            <a:off x="1295400" y="1341438"/>
+            <a:ext cx="9601133" cy="0"/>
           </a:xfrm>
           <a:prstGeom prst="line">
             <a:avLst/>
@@ -8481,8 +8714,8 @@
         </p:nvSpPr>
         <p:spPr>
           <a:xfrm>
-            <a:off x="971525" y="1631117"/>
-            <a:ext cx="3600450" cy="4679950"/>
+            <a:off x="1295367" y="1631117"/>
+            <a:ext cx="4800600" cy="4679950"/>
           </a:xfrm>
         </p:spPr>
         <p:txBody>
@@ -8514,8 +8747,8 @@
         </p:nvSpPr>
         <p:spPr>
           <a:xfrm>
-            <a:off x="4572000" y="1628775"/>
-            <a:ext cx="3600450" cy="4679950"/>
+            <a:off x="6096000" y="1628775"/>
+            <a:ext cx="4800600" cy="4679950"/>
           </a:xfrm>
         </p:spPr>
         <p:txBody>
@@ -8578,8 +8811,8 @@
         </p:nvSpPr>
         <p:spPr>
           <a:xfrm>
-            <a:off x="971602" y="5678265"/>
-            <a:ext cx="2892128" cy="355128"/>
+            <a:off x="1295469" y="5678265"/>
+            <a:ext cx="3856171" cy="355128"/>
           </a:xfrm>
           <a:prstGeom prst="rect">
             <a:avLst/>
@@ -8765,8 +8998,8 @@
         </p:nvSpPr>
         <p:spPr>
           <a:xfrm>
-            <a:off x="3275869" y="5668165"/>
-            <a:ext cx="4884737" cy="365228"/>
+            <a:off x="4367826" y="5668165"/>
+            <a:ext cx="6512983" cy="365228"/>
           </a:xfrm>
         </p:spPr>
         <p:txBody>
@@ -8802,8 +9035,8 @@
           </p:nvPr>
         </p:nvGraphicFramePr>
         <p:xfrm>
-          <a:off x="971571" y="5221846"/>
-          <a:ext cx="2304305" cy="438965"/>
+          <a:off x="1295429" y="5221847"/>
+          <a:ext cx="3072407" cy="438965"/>
         </p:xfrm>
         <a:graphic>
           <a:graphicData uri="http://schemas.openxmlformats.org/drawingml/2006/diagram">
@@ -8823,8 +9056,8 @@
         </p:nvSpPr>
         <p:spPr>
           <a:xfrm>
-            <a:off x="3275857" y="5229273"/>
-            <a:ext cx="4896596" cy="438941"/>
+            <a:off x="4367809" y="5229274"/>
+            <a:ext cx="6528795" cy="438941"/>
           </a:xfrm>
         </p:spPr>
         <p:txBody>
@@ -8859,8 +9092,8 @@
           </p:nvPr>
         </p:nvGraphicFramePr>
         <p:xfrm>
-          <a:off x="3111314" y="1621384"/>
-          <a:ext cx="2897783" cy="1800225"/>
+          <a:off x="4148419" y="1621385"/>
+          <a:ext cx="3863711" cy="1800225"/>
         </p:xfrm>
         <a:graphic>
           <a:graphicData uri="http://schemas.openxmlformats.org/drawingml/2006/diagram">
@@ -8910,8 +9143,8 @@
         </p:nvSpPr>
         <p:spPr>
           <a:xfrm>
-            <a:off x="971550" y="1628779"/>
-            <a:ext cx="7200850" cy="4679951"/>
+            <a:off x="1295400" y="1628779"/>
+            <a:ext cx="9601133" cy="4679951"/>
           </a:xfrm>
         </p:spPr>
         <p:txBody>
@@ -8998,8 +9231,8 @@
         </p:nvCxnSpPr>
         <p:spPr>
           <a:xfrm>
-            <a:off x="971550" y="1341438"/>
-            <a:ext cx="7200850" cy="0"/>
+            <a:off x="1295400" y="1341438"/>
+            <a:ext cx="9601133" cy="0"/>
           </a:xfrm>
           <a:prstGeom prst="line">
             <a:avLst/>
@@ -9063,8 +9296,8 @@
         </p:nvSpPr>
         <p:spPr>
           <a:xfrm>
-            <a:off x="971550" y="1628779"/>
-            <a:ext cx="7200850" cy="4679951"/>
+            <a:off x="1295400" y="1628779"/>
+            <a:ext cx="9601133" cy="4679951"/>
           </a:xfrm>
         </p:spPr>
         <p:txBody>
@@ -9149,8 +9382,8 @@
         </p:nvCxnSpPr>
         <p:spPr>
           <a:xfrm>
-            <a:off x="971550" y="1341438"/>
-            <a:ext cx="7200850" cy="0"/>
+            <a:off x="1295400" y="1341438"/>
+            <a:ext cx="9601133" cy="0"/>
           </a:xfrm>
           <a:prstGeom prst="line">
             <a:avLst/>
@@ -9214,8 +9447,8 @@
         </p:nvSpPr>
         <p:spPr>
           <a:xfrm>
-            <a:off x="971550" y="1916113"/>
-            <a:ext cx="7200850" cy="4392612"/>
+            <a:off x="1295400" y="1916113"/>
+            <a:ext cx="9601133" cy="4392612"/>
           </a:xfrm>
         </p:spPr>
         <p:txBody>
@@ -9276,8 +9509,8 @@
         </p:nvSpPr>
         <p:spPr>
           <a:xfrm>
-            <a:off x="971650" y="552147"/>
-            <a:ext cx="7200800" cy="1076628"/>
+            <a:off x="1295533" y="552147"/>
+            <a:ext cx="9601067" cy="1076628"/>
           </a:xfrm>
         </p:spPr>
         <p:txBody>
@@ -9314,8 +9547,8 @@
         </p:nvCxnSpPr>
         <p:spPr>
           <a:xfrm>
-            <a:off x="971601" y="1628775"/>
-            <a:ext cx="7200850" cy="0"/>
+            <a:off x="1295468" y="1628775"/>
+            <a:ext cx="9601133" cy="0"/>
           </a:xfrm>
           <a:prstGeom prst="line">
             <a:avLst/>
@@ -9420,8 +9653,8 @@
         </p:nvSpPr>
         <p:spPr>
           <a:xfrm>
-            <a:off x="971550" y="1628779"/>
-            <a:ext cx="7200850" cy="4679951"/>
+            <a:off x="1295400" y="1628779"/>
+            <a:ext cx="9601133" cy="4679951"/>
           </a:xfrm>
         </p:spPr>
         <p:txBody>
@@ -9510,8 +9743,8 @@
         </p:nvSpPr>
         <p:spPr>
           <a:xfrm>
-            <a:off x="975376" y="3429048"/>
-            <a:ext cx="7200800" cy="1800225"/>
+            <a:off x="1300501" y="3429049"/>
+            <a:ext cx="9601067" cy="1800225"/>
           </a:xfrm>
         </p:spPr>
         <p:txBody>
@@ -9541,8 +9774,8 @@
         </p:nvCxnSpPr>
         <p:spPr>
           <a:xfrm>
-            <a:off x="975375" y="3429000"/>
-            <a:ext cx="7200850" cy="0"/>
+            <a:off x="1300500" y="3429000"/>
+            <a:ext cx="9601133" cy="0"/>
           </a:xfrm>
           <a:prstGeom prst="line">
             <a:avLst/>
@@ -9576,8 +9809,8 @@
         </p:nvSpPr>
         <p:spPr>
           <a:xfrm>
-            <a:off x="975375" y="1636294"/>
-            <a:ext cx="7197076" cy="1792753"/>
+            <a:off x="1300500" y="1636295"/>
+            <a:ext cx="9596101" cy="1792753"/>
           </a:xfrm>
         </p:spPr>
         <p:txBody>
@@ -9667,8 +9900,8 @@
         </p:nvCxnSpPr>
         <p:spPr>
           <a:xfrm>
-            <a:off x="971550" y="1341438"/>
-            <a:ext cx="7200850" cy="0"/>
+            <a:off x="1295400" y="1341438"/>
+            <a:ext cx="9601133" cy="0"/>
           </a:xfrm>
           <a:prstGeom prst="line">
             <a:avLst/>
@@ -9702,8 +9935,8 @@
         </p:nvSpPr>
         <p:spPr>
           <a:xfrm>
-            <a:off x="971550" y="1628775"/>
-            <a:ext cx="3600450" cy="4679950"/>
+            <a:off x="1295400" y="1628775"/>
+            <a:ext cx="4800600" cy="4679950"/>
           </a:xfrm>
         </p:spPr>
         <p:txBody>
@@ -9735,8 +9968,8 @@
         </p:nvSpPr>
         <p:spPr>
           <a:xfrm>
-            <a:off x="4572000" y="1628775"/>
-            <a:ext cx="3600450" cy="4679950"/>
+            <a:off x="6096000" y="1628775"/>
+            <a:ext cx="4800600" cy="4679950"/>
           </a:xfrm>
         </p:spPr>
         <p:txBody>
@@ -9824,8 +10057,8 @@
         </p:nvCxnSpPr>
         <p:spPr>
           <a:xfrm>
-            <a:off x="971550" y="1341438"/>
-            <a:ext cx="7200850" cy="0"/>
+            <a:off x="1295400" y="1341438"/>
+            <a:ext cx="9601133" cy="0"/>
           </a:xfrm>
           <a:prstGeom prst="line">
             <a:avLst/>
@@ -9859,8 +10092,8 @@
         </p:nvSpPr>
         <p:spPr>
           <a:xfrm>
-            <a:off x="971550" y="2420938"/>
-            <a:ext cx="3600450" cy="3887786"/>
+            <a:off x="1295400" y="2420938"/>
+            <a:ext cx="4800600" cy="3887786"/>
           </a:xfrm>
         </p:spPr>
         <p:txBody>
@@ -9901,8 +10134,8 @@
         </p:nvSpPr>
         <p:spPr>
           <a:xfrm>
-            <a:off x="4572000" y="2420938"/>
-            <a:ext cx="3600450" cy="3887786"/>
+            <a:off x="6096000" y="2420938"/>
+            <a:ext cx="4800600" cy="3887786"/>
           </a:xfrm>
         </p:spPr>
         <p:txBody>
@@ -9943,8 +10176,8 @@
         </p:nvSpPr>
         <p:spPr>
           <a:xfrm>
-            <a:off x="971550" y="1628775"/>
-            <a:ext cx="3600450" cy="792163"/>
+            <a:off x="1295400" y="1628775"/>
+            <a:ext cx="4800600" cy="792163"/>
           </a:xfrm>
         </p:spPr>
         <p:txBody>
@@ -9980,8 +10213,8 @@
         </p:nvSpPr>
         <p:spPr>
           <a:xfrm>
-            <a:off x="4571950" y="1628775"/>
-            <a:ext cx="3600450" cy="792163"/>
+            <a:off x="6095933" y="1628775"/>
+            <a:ext cx="4800600" cy="792163"/>
           </a:xfrm>
         </p:spPr>
         <p:txBody>
@@ -10084,8 +10317,8 @@
         </p:nvCxnSpPr>
         <p:spPr>
           <a:xfrm>
-            <a:off x="971550" y="1341438"/>
-            <a:ext cx="7200850" cy="0"/>
+            <a:off x="1295400" y="1341438"/>
+            <a:ext cx="9601133" cy="0"/>
           </a:xfrm>
           <a:prstGeom prst="line">
             <a:avLst/>
@@ -10179,8 +10412,8 @@
         </p:nvSpPr>
         <p:spPr>
           <a:xfrm>
-            <a:off x="971550" y="5229226"/>
-            <a:ext cx="7200850" cy="576038"/>
+            <a:off x="1295400" y="5229226"/>
+            <a:ext cx="9601133" cy="576038"/>
           </a:xfrm>
         </p:spPr>
         <p:txBody>
@@ -10214,8 +10447,8 @@
         </p:nvSpPr>
         <p:spPr>
           <a:xfrm>
-            <a:off x="971550" y="5817335"/>
-            <a:ext cx="7200900" cy="491390"/>
+            <a:off x="1295400" y="5817335"/>
+            <a:ext cx="9601200" cy="491390"/>
           </a:xfrm>
         </p:spPr>
         <p:txBody>
@@ -10249,8 +10482,8 @@
         </p:nvSpPr>
         <p:spPr>
           <a:xfrm>
-            <a:off x="971550" y="549276"/>
-            <a:ext cx="7200900" cy="4667879"/>
+            <a:off x="1295400" y="549277"/>
+            <a:ext cx="9601200" cy="4667879"/>
           </a:xfrm>
         </p:spPr>
         <p:txBody>
@@ -10317,8 +10550,8 @@
         </p:nvSpPr>
         <p:spPr>
           <a:xfrm>
-            <a:off x="971550" y="5229226"/>
-            <a:ext cx="7200850" cy="576038"/>
+            <a:off x="1295400" y="5229226"/>
+            <a:ext cx="9601133" cy="576038"/>
           </a:xfrm>
         </p:spPr>
         <p:txBody>
@@ -10352,8 +10585,8 @@
         </p:nvSpPr>
         <p:spPr>
           <a:xfrm>
-            <a:off x="971550" y="549321"/>
-            <a:ext cx="7200900" cy="4679951"/>
+            <a:off x="1295400" y="549322"/>
+            <a:ext cx="9601200" cy="4679951"/>
           </a:xfrm>
         </p:spPr>
         <p:txBody>
@@ -10385,8 +10618,8 @@
         </p:nvSpPr>
         <p:spPr>
           <a:xfrm>
-            <a:off x="971550" y="5817335"/>
-            <a:ext cx="7200900" cy="491390"/>
+            <a:off x="1295400" y="5817335"/>
+            <a:ext cx="9601200" cy="491390"/>
           </a:xfrm>
         </p:spPr>
         <p:txBody>
@@ -10460,8 +10693,8 @@
         </p:nvSpPr>
         <p:spPr>
           <a:xfrm>
-            <a:off x="971602" y="1628775"/>
-            <a:ext cx="7200800" cy="4679950"/>
+            <a:off x="1295469" y="1628775"/>
+            <a:ext cx="9601067" cy="4679950"/>
           </a:xfrm>
           <a:prstGeom prst="rect">
             <a:avLst/>
@@ -10493,8 +10726,8 @@
         </p:nvSpPr>
         <p:spPr>
           <a:xfrm>
-            <a:off x="971602" y="549276"/>
-            <a:ext cx="7200800" cy="792163"/>
+            <a:off x="1295469" y="549276"/>
+            <a:ext cx="9601067" cy="792163"/>
           </a:xfrm>
           <a:prstGeom prst="rect">
             <a:avLst/>
@@ -10818,7 +11051,7 @@
             <a:srgbClr val="F26B43"/>
           </p15:clr>
         </p15:guide>
-        <p15:guide id="2" pos="2880" userDrawn="1">
+        <p15:guide id="2" pos="3840" userDrawn="1">
           <p15:clr>
             <a:srgbClr val="F26B43"/>
           </p15:clr>
@@ -10833,12 +11066,12 @@
             <a:srgbClr val="F26B43"/>
           </p15:clr>
         </p15:guide>
-        <p15:guide id="5" pos="5148" userDrawn="1">
+        <p15:guide id="5" pos="6864" userDrawn="1">
           <p15:clr>
             <a:srgbClr val="F26B43"/>
           </p15:clr>
         </p15:guide>
-        <p15:guide id="6" pos="612" userDrawn="1">
+        <p15:guide id="6" pos="816" userDrawn="1">
           <p15:clr>
             <a:srgbClr val="F26B43"/>
           </p15:clr>
@@ -10853,12 +11086,12 @@
             <a:srgbClr val="F26B43"/>
           </p15:clr>
         </p15:guide>
-        <p15:guide id="12" pos="1179" userDrawn="1">
+        <p15:guide id="12" pos="1572" userDrawn="1">
           <p15:clr>
             <a:srgbClr val="FDE53C"/>
           </p15:clr>
         </p15:guide>
-        <p15:guide id="13" pos="4581" userDrawn="1">
+        <p15:guide id="13" pos="6108" userDrawn="1">
           <p15:clr>
             <a:srgbClr val="FDE53C"/>
           </p15:clr>
@@ -10903,8 +11136,8 @@
         </p:nvSpPr>
         <p:spPr>
           <a:xfrm>
-            <a:off x="971602" y="1628775"/>
-            <a:ext cx="7200800" cy="4679950"/>
+            <a:off x="1295469" y="1628775"/>
+            <a:ext cx="9601067" cy="4679950"/>
           </a:xfrm>
           <a:prstGeom prst="rect">
             <a:avLst/>
@@ -10937,8 +11170,8 @@
         </p:nvSpPr>
         <p:spPr>
           <a:xfrm>
-            <a:off x="971602" y="549276"/>
-            <a:ext cx="7200800" cy="792163"/>
+            <a:off x="1295469" y="549276"/>
+            <a:ext cx="9601067" cy="792163"/>
           </a:xfrm>
           <a:prstGeom prst="rect">
             <a:avLst/>
@@ -11247,7 +11480,7 @@
             <a:srgbClr val="F26B43"/>
           </p15:clr>
         </p15:guide>
-        <p15:guide id="2" pos="2880" userDrawn="1">
+        <p15:guide id="2" pos="3840" userDrawn="1">
           <p15:clr>
             <a:srgbClr val="F26B43"/>
           </p15:clr>
@@ -11262,12 +11495,12 @@
             <a:srgbClr val="F26B43"/>
           </p15:clr>
         </p15:guide>
-        <p15:guide id="5" pos="5148" userDrawn="1">
+        <p15:guide id="5" pos="6864" userDrawn="1">
           <p15:clr>
             <a:srgbClr val="F26B43"/>
           </p15:clr>
         </p15:guide>
-        <p15:guide id="6" pos="612" userDrawn="1">
+        <p15:guide id="6" pos="816" userDrawn="1">
           <p15:clr>
             <a:srgbClr val="F26B43"/>
           </p15:clr>
@@ -11344,7 +11577,7 @@
         </p:nvSpPr>
         <p:spPr>
           <a:xfrm>
-            <a:off x="3275410" y="4779169"/>
+            <a:off x="4799410" y="4779169"/>
             <a:ext cx="4897040" cy="329804"/>
           </a:xfrm>
         </p:spPr>
@@ -11424,182 +11657,56 @@
         </p:nvSpPr>
         <p:spPr/>
         <p:txBody>
-          <a:bodyPr>
-            <a:normAutofit fontScale="92500"/>
-          </a:bodyPr>
+          <a:bodyPr/>
           <a:lstStyle/>
           <a:p>
+            <a:pPr marL="457200" indent="-457200">
+              <a:buAutoNum type="arabicPeriod"/>
+            </a:pPr>
+            <a:r>
+              <a:rPr lang="ru-RU" dirty="0" smtClean="0"/>
+              <a:t>Тест должен быть понятным! </a:t>
+            </a:r>
             <a:r>
               <a:rPr lang="en-US" dirty="0" smtClean="0"/>
-              <a:t>Arrange: </a:t>
-            </a:r>
-          </a:p>
-          <a:p>
-            <a:pPr marL="342900" indent="-342900">
-              <a:buFont typeface="Arial" panose="020B0604020202020204" pitchFamily="34" charset="0"/>
-              <a:buChar char="•"/>
+              <a:t/>
+            </a:r>
+            <a:br>
+              <a:rPr lang="en-US" dirty="0" smtClean="0"/>
+            </a:br>
+            <a:r>
+              <a:rPr lang="en-US" dirty="0" smtClean="0"/>
+              <a:t>DAMP</a:t>
+            </a:r>
+            <a:r>
+              <a:rPr lang="ru-RU" dirty="0" smtClean="0"/>
+              <a:t> — </a:t>
+            </a:r>
+            <a:r>
+              <a:rPr lang="en-US" dirty="0" smtClean="0"/>
+              <a:t>descriptive and meaningful phrases.</a:t>
+            </a:r>
+            <a:endParaRPr lang="ru-RU" dirty="0"/>
+          </a:p>
+          <a:p>
+            <a:pPr marL="457200" indent="-457200">
+              <a:buAutoNum type="arabicPeriod"/>
             </a:pPr>
             <a:r>
-              <a:rPr lang="en-US" dirty="0" err="1" smtClean="0"/>
-              <a:t>SetUp</a:t>
-            </a:r>
-            <a:r>
-              <a:rPr lang="en-US" dirty="0" smtClean="0"/>
-              <a:t>, </a:t>
-            </a:r>
-          </a:p>
-          <a:p>
-            <a:pPr marL="342900" indent="-342900">
-              <a:buFont typeface="Arial" panose="020B0604020202020204" pitchFamily="34" charset="0"/>
-              <a:buChar char="•"/>
-            </a:pPr>
-            <a:r>
-              <a:rPr lang="en-US" dirty="0" smtClean="0"/>
-              <a:t>Object Mother pattern, </a:t>
-            </a:r>
-          </a:p>
-          <a:p>
-            <a:pPr marL="342900" indent="-342900">
-              <a:buFont typeface="Arial" panose="020B0604020202020204" pitchFamily="34" charset="0"/>
-              <a:buChar char="•"/>
-            </a:pPr>
-            <a:r>
-              <a:rPr lang="en-US" dirty="0" smtClean="0"/>
-              <a:t>Test Data Builder pattern</a:t>
-            </a:r>
-          </a:p>
-          <a:p>
-            <a:r>
-              <a:rPr lang="en-US" dirty="0" smtClean="0"/>
-              <a:t>Act:</a:t>
-            </a:r>
-          </a:p>
-          <a:p>
-            <a:pPr marL="342900" indent="-342900">
-              <a:buFont typeface="Arial" panose="020B0604020202020204" pitchFamily="34" charset="0"/>
-              <a:buChar char="•"/>
-            </a:pPr>
-            <a:r>
               <a:rPr lang="ru-RU" dirty="0" smtClean="0"/>
-              <a:t>Изоляция тестируемого интерфейса</a:t>
-            </a:r>
-          </a:p>
-          <a:p>
-            <a:r>
-              <a:rPr lang="en-US" dirty="0" smtClean="0"/>
-              <a:t>Assert:</a:t>
-            </a:r>
-            <a:endParaRPr lang="en-US" dirty="0"/>
-          </a:p>
-          <a:p>
-            <a:pPr marL="342900" indent="-342900">
-              <a:buFont typeface="Arial" panose="020B0604020202020204" pitchFamily="34" charset="0"/>
-              <a:buChar char="•"/>
-            </a:pPr>
+              <a:t>Дублирование приводит к хрупкости. Нужно </a:t>
+            </a:r>
+            <a:r>
+              <a:rPr lang="ru-RU" dirty="0" err="1" smtClean="0"/>
+              <a:t>рефакторить</a:t>
+            </a:r>
             <a:r>
               <a:rPr lang="ru-RU" dirty="0" smtClean="0"/>
-              <a:t>Свой </a:t>
-            </a:r>
-            <a:r>
-              <a:rPr lang="en-US" dirty="0" smtClean="0"/>
-              <a:t>comparer, </a:t>
-            </a:r>
-            <a:endParaRPr lang="ru-RU" dirty="0" smtClean="0"/>
-          </a:p>
-          <a:p>
-            <a:pPr marL="342900" indent="-342900">
-              <a:buFont typeface="Arial" panose="020B0604020202020204" pitchFamily="34" charset="0"/>
-              <a:buChar char="•"/>
-            </a:pPr>
-            <a:r>
-              <a:rPr lang="ru-RU" dirty="0" smtClean="0"/>
-              <a:t>Расширение тестового </a:t>
-            </a:r>
-            <a:r>
-              <a:rPr lang="ru-RU" dirty="0" err="1" smtClean="0"/>
-              <a:t>фреймворка</a:t>
-            </a:r>
-            <a:endParaRPr lang="ru-RU" dirty="0" smtClean="0"/>
-          </a:p>
-          <a:p>
-            <a:pPr marL="342900" indent="-342900">
-              <a:buFont typeface="Arial" panose="020B0604020202020204" pitchFamily="34" charset="0"/>
-              <a:buChar char="•"/>
-            </a:pPr>
-            <a:r>
-              <a:rPr lang="ru-RU" dirty="0" smtClean="0"/>
-              <a:t>Глубокое сравнение (</a:t>
-            </a:r>
-            <a:r>
-              <a:rPr lang="en-US" dirty="0" smtClean="0"/>
-              <a:t>FA: </a:t>
-            </a:r>
-            <a:r>
-              <a:rPr lang="en-US" dirty="0" err="1" smtClean="0">
-                <a:hlinkClick r:id="rId2"/>
-              </a:rPr>
-              <a:t>BeEquivalent</a:t>
-            </a:r>
-            <a:r>
-              <a:rPr lang="en-US" dirty="0" smtClean="0"/>
-              <a:t> / </a:t>
-            </a:r>
-            <a:r>
-              <a:rPr lang="en-US" dirty="0" err="1" smtClean="0">
-                <a:hlinkClick r:id="rId3"/>
-              </a:rPr>
-              <a:t>DeepEqual</a:t>
-            </a:r>
-            <a:r>
-              <a:rPr lang="en-US" dirty="0" smtClean="0"/>
-              <a:t>)</a:t>
-            </a:r>
-            <a:endParaRPr lang="ru-RU" dirty="0" smtClean="0"/>
-          </a:p>
-          <a:p>
-            <a:pPr marL="342900" indent="-342900">
-              <a:buFont typeface="Arial" panose="020B0604020202020204" pitchFamily="34" charset="0"/>
-              <a:buChar char="•"/>
-            </a:pPr>
-            <a:r>
-              <a:rPr lang="en-US" dirty="0" smtClean="0"/>
-              <a:t>[</a:t>
-            </a:r>
-            <a:r>
-              <a:rPr lang="ru-RU" dirty="0" smtClean="0"/>
-              <a:t>Переопределение </a:t>
-            </a:r>
-            <a:r>
-              <a:rPr lang="en-US" dirty="0" smtClean="0"/>
-              <a:t>Equals </a:t>
-            </a:r>
-            <a:r>
-              <a:rPr lang="ru-RU" dirty="0" smtClean="0"/>
-              <a:t>/</a:t>
-            </a:r>
-            <a:r>
-              <a:rPr lang="en-US" dirty="0" smtClean="0"/>
-              <a:t> </a:t>
-            </a:r>
-            <a:r>
-              <a:rPr lang="en-US" dirty="0" err="1" smtClean="0"/>
-              <a:t>ToString</a:t>
-            </a:r>
-            <a:r>
-              <a:rPr lang="en-US" dirty="0" smtClean="0"/>
-              <a:t>]</a:t>
-            </a:r>
-            <a:endParaRPr lang="ru-RU" dirty="0" smtClean="0"/>
-          </a:p>
-          <a:p>
-            <a:endParaRPr lang="ru-RU" dirty="0" smtClean="0"/>
-          </a:p>
-          <a:p>
-            <a:pPr marL="342900" indent="-342900">
-              <a:buFont typeface="Arial" panose="020B0604020202020204" pitchFamily="34" charset="0"/>
-              <a:buChar char="•"/>
-            </a:pPr>
-            <a:endParaRPr lang="en-US" dirty="0" smtClean="0"/>
+              <a:t>.</a:t>
+            </a:r>
+          </a:p>
+          <a:p>
+            <a:endParaRPr lang="ru-RU" dirty="0"/>
           </a:p>
         </p:txBody>
       </p:sp>
@@ -11620,11 +11727,11 @@
           <a:p>
             <a:r>
               <a:rPr lang="en-US" dirty="0" smtClean="0"/>
-              <a:t>DRY </a:t>
+              <a:t>DRY</a:t>
             </a:r>
             <a:r>
               <a:rPr lang="ru-RU" dirty="0" smtClean="0"/>
-              <a:t>в тестах</a:t>
+              <a:t> в тестах?</a:t>
             </a:r>
             <a:endParaRPr lang="ru-RU" dirty="0"/>
           </a:p>
@@ -11633,7 +11740,7 @@
     </p:spTree>
     <p:extLst>
       <p:ext uri="{BB962C8B-B14F-4D97-AF65-F5344CB8AC3E}">
-        <p14:creationId xmlns:p14="http://schemas.microsoft.com/office/powerpoint/2010/main" val="3046563846"/>
+        <p14:creationId xmlns:p14="http://schemas.microsoft.com/office/powerpoint/2010/main" val="3189334414"/>
       </p:ext>
     </p:extLst>
   </p:cSld>
@@ -11679,38 +11786,181 @@
         </p:nvSpPr>
         <p:spPr/>
         <p:txBody>
-          <a:bodyPr/>
+          <a:bodyPr>
+            <a:normAutofit lnSpcReduction="10000"/>
+          </a:bodyPr>
           <a:lstStyle/>
           <a:p>
             <a:r>
               <a:rPr lang="en-US" dirty="0" smtClean="0"/>
-              <a:t>Unit</a:t>
-            </a:r>
+              <a:t>Arrange: </a:t>
+            </a:r>
+          </a:p>
+          <a:p>
+            <a:pPr marL="342900" indent="-342900">
+              <a:buFont typeface="Arial" panose="020B0604020202020204" pitchFamily="34" charset="0"/>
+              <a:buChar char="•"/>
+            </a:pPr>
+            <a:r>
+              <a:rPr lang="en-US" dirty="0" err="1" smtClean="0"/>
+              <a:t>SetUp</a:t>
+            </a:r>
+            <a:r>
+              <a:rPr lang="en-US" dirty="0" smtClean="0"/>
+              <a:t>, </a:t>
+            </a:r>
+          </a:p>
+          <a:p>
+            <a:pPr marL="342900" indent="-342900">
+              <a:buFont typeface="Arial" panose="020B0604020202020204" pitchFamily="34" charset="0"/>
+              <a:buChar char="•"/>
+            </a:pPr>
+            <a:r>
+              <a:rPr lang="en-US" dirty="0" smtClean="0"/>
+              <a:t>Object Mother pattern, </a:t>
+            </a:r>
+          </a:p>
+          <a:p>
+            <a:pPr marL="342900" indent="-342900">
+              <a:buFont typeface="Arial" panose="020B0604020202020204" pitchFamily="34" charset="0"/>
+              <a:buChar char="•"/>
+            </a:pPr>
+            <a:r>
+              <a:rPr lang="en-US" dirty="0" smtClean="0"/>
+              <a:t>Test Data Builder pattern</a:t>
+            </a:r>
+          </a:p>
+          <a:p>
+            <a:r>
+              <a:rPr lang="en-US" dirty="0" smtClean="0"/>
+              <a:t>Act:</a:t>
+            </a:r>
+          </a:p>
+          <a:p>
+            <a:pPr marL="342900" indent="-342900">
+              <a:buFont typeface="Arial" panose="020B0604020202020204" pitchFamily="34" charset="0"/>
+              <a:buChar char="•"/>
+            </a:pPr>
             <a:r>
               <a:rPr lang="ru-RU" dirty="0" smtClean="0"/>
-              <a:t> — инструмент обратной связи при разработке</a:t>
-            </a:r>
-          </a:p>
-          <a:p>
-            <a:endParaRPr lang="ru-RU" dirty="0"/>
+              <a:t>Изоляция тестируемого интерфейса</a:t>
+            </a:r>
           </a:p>
           <a:p>
             <a:r>
               <a:rPr lang="en-US" dirty="0" smtClean="0"/>
-              <a:t>Integration</a:t>
-            </a:r>
+              <a:t>Assert:</a:t>
+            </a:r>
+            <a:endParaRPr lang="en-US" dirty="0"/>
+          </a:p>
+          <a:p>
+            <a:pPr marL="342900" indent="-342900">
+              <a:buFont typeface="Arial" panose="020B0604020202020204" pitchFamily="34" charset="0"/>
+              <a:buChar char="•"/>
+            </a:pPr>
             <a:r>
               <a:rPr lang="ru-RU" dirty="0" smtClean="0"/>
-              <a:t> — инструмент </a:t>
+              <a:t>Свой </a:t>
             </a:r>
             <a:r>
               <a:rPr lang="en-US" dirty="0" smtClean="0"/>
-              <a:t>QA</a:t>
-            </a:r>
+              <a:t>comparer, </a:t>
+            </a:r>
+            <a:endParaRPr lang="ru-RU" dirty="0" smtClean="0"/>
+          </a:p>
+          <a:p>
+            <a:pPr marL="342900" indent="-342900">
+              <a:buFont typeface="Arial" panose="020B0604020202020204" pitchFamily="34" charset="0"/>
+              <a:buChar char="•"/>
+            </a:pPr>
             <a:r>
               <a:rPr lang="ru-RU" dirty="0" smtClean="0"/>
-              <a:t>: регрессия, и вотчина тестировщика.</a:t>
-            </a:r>
+              <a:t>Расширение тестового </a:t>
+            </a:r>
+            <a:r>
+              <a:rPr lang="ru-RU" dirty="0" err="1" smtClean="0"/>
+              <a:t>фреймворка</a:t>
+            </a:r>
+            <a:endParaRPr lang="ru-RU" dirty="0" smtClean="0"/>
+          </a:p>
+          <a:p>
+            <a:pPr marL="342900" indent="-342900">
+              <a:buFont typeface="Arial" panose="020B0604020202020204" pitchFamily="34" charset="0"/>
+              <a:buChar char="•"/>
+            </a:pPr>
+            <a:r>
+              <a:rPr lang="ru-RU" dirty="0" smtClean="0"/>
+              <a:t>Глубокое сравнение (</a:t>
+            </a:r>
+            <a:r>
+              <a:rPr lang="en-US" dirty="0" smtClean="0"/>
+              <a:t>FA: </a:t>
+            </a:r>
+            <a:r>
+              <a:rPr lang="en-US" dirty="0" err="1" smtClean="0">
+                <a:hlinkClick r:id="rId2"/>
+              </a:rPr>
+              <a:t>BeEquivalent</a:t>
+            </a:r>
+            <a:r>
+              <a:rPr lang="en-US" dirty="0" smtClean="0"/>
+              <a:t> / </a:t>
+            </a:r>
+            <a:r>
+              <a:rPr lang="en-US" dirty="0" err="1" smtClean="0">
+                <a:hlinkClick r:id="rId3"/>
+              </a:rPr>
+              <a:t>DeepEqual</a:t>
+            </a:r>
+            <a:r>
+              <a:rPr lang="en-US" dirty="0" smtClean="0"/>
+              <a:t>)</a:t>
+            </a:r>
+            <a:endParaRPr lang="ru-RU" dirty="0" smtClean="0"/>
+          </a:p>
+          <a:p>
+            <a:pPr marL="342900" indent="-342900">
+              <a:buFont typeface="Arial" panose="020B0604020202020204" pitchFamily="34" charset="0"/>
+              <a:buChar char="•"/>
+            </a:pPr>
+            <a:r>
+              <a:rPr lang="en-US" dirty="0" smtClean="0"/>
+              <a:t>[</a:t>
+            </a:r>
+            <a:r>
+              <a:rPr lang="ru-RU" dirty="0" smtClean="0"/>
+              <a:t>Переопределение </a:t>
+            </a:r>
+            <a:r>
+              <a:rPr lang="en-US" dirty="0" smtClean="0"/>
+              <a:t>Equals </a:t>
+            </a:r>
+            <a:r>
+              <a:rPr lang="ru-RU" dirty="0" smtClean="0"/>
+              <a:t>/</a:t>
+            </a:r>
+            <a:r>
+              <a:rPr lang="en-US" dirty="0" smtClean="0"/>
+              <a:t> </a:t>
+            </a:r>
+            <a:r>
+              <a:rPr lang="en-US" dirty="0" err="1" smtClean="0"/>
+              <a:t>ToString</a:t>
+            </a:r>
+            <a:r>
+              <a:rPr lang="en-US" dirty="0" smtClean="0"/>
+              <a:t>]</a:t>
+            </a:r>
+            <a:endParaRPr lang="ru-RU" dirty="0" smtClean="0"/>
+          </a:p>
+          <a:p>
+            <a:endParaRPr lang="ru-RU" dirty="0" smtClean="0"/>
+          </a:p>
+          <a:p>
+            <a:pPr marL="342900" indent="-342900">
+              <a:buFont typeface="Arial" panose="020B0604020202020204" pitchFamily="34" charset="0"/>
+              <a:buChar char="•"/>
+            </a:pPr>
             <a:endParaRPr lang="en-US" dirty="0" smtClean="0"/>
           </a:p>
         </p:txBody>
@@ -11732,7 +11982,11 @@
           <a:p>
             <a:r>
               <a:rPr lang="en-US" dirty="0" smtClean="0"/>
-              <a:t>Integration vs Unit</a:t>
+              <a:t>DRY </a:t>
+            </a:r>
+            <a:r>
+              <a:rPr lang="ru-RU" dirty="0" smtClean="0"/>
+              <a:t>в тестах</a:t>
             </a:r>
             <a:endParaRPr lang="ru-RU" dirty="0"/>
           </a:p>
@@ -11741,7 +11995,7 @@
     </p:spTree>
     <p:extLst>
       <p:ext uri="{BB962C8B-B14F-4D97-AF65-F5344CB8AC3E}">
-        <p14:creationId xmlns:p14="http://schemas.microsoft.com/office/powerpoint/2010/main" val="677875832"/>
+        <p14:creationId xmlns:p14="http://schemas.microsoft.com/office/powerpoint/2010/main" val="3046563846"/>
       </p:ext>
     </p:extLst>
   </p:cSld>
@@ -11790,35 +12044,36 @@
           <a:bodyPr/>
           <a:lstStyle/>
           <a:p>
-            <a:pPr marL="342900" indent="-342900">
-              <a:buFont typeface="Arial" panose="020B0604020202020204" pitchFamily="34" charset="0"/>
-              <a:buChar char="•"/>
-            </a:pPr>
+            <a:r>
+              <a:rPr lang="en-US" dirty="0" smtClean="0"/>
+              <a:t>Unit</a:t>
+            </a:r>
             <a:r>
               <a:rPr lang="ru-RU" dirty="0" smtClean="0"/>
-              <a:t>Баги возникают при разработке и рефакторинге</a:t>
-            </a:r>
-          </a:p>
-          <a:p>
-            <a:pPr marL="342900" indent="-342900">
-              <a:buFont typeface="Arial" panose="020B0604020202020204" pitchFamily="34" charset="0"/>
-              <a:buChar char="•"/>
-            </a:pPr>
+              <a:t> — инструмент обратной связи при разработке</a:t>
+            </a:r>
+          </a:p>
+          <a:p>
+            <a:endParaRPr lang="ru-RU" dirty="0"/>
+          </a:p>
+          <a:p>
+            <a:r>
+              <a:rPr lang="en-US" dirty="0" smtClean="0"/>
+              <a:t>Integration</a:t>
+            </a:r>
             <a:r>
               <a:rPr lang="ru-RU" dirty="0" smtClean="0"/>
-              <a:t>После — крайне редко.</a:t>
-            </a:r>
-            <a:endParaRPr lang="ru-RU" dirty="0"/>
-          </a:p>
-          <a:p>
-            <a:pPr marL="342900" indent="-342900">
-              <a:buFont typeface="Arial" panose="020B0604020202020204" pitchFamily="34" charset="0"/>
-              <a:buChar char="•"/>
-            </a:pPr>
+              <a:t> — инструмент </a:t>
+            </a:r>
+            <a:r>
+              <a:rPr lang="en-US" dirty="0" smtClean="0"/>
+              <a:t>QA</a:t>
+            </a:r>
             <a:r>
               <a:rPr lang="ru-RU" dirty="0" smtClean="0"/>
-              <a:t>Тесты, созданные после окончания разработки — почти бесполезны.</a:t>
-            </a:r>
+              <a:t>: регрессия, и вотчина тестировщика.</a:t>
+            </a:r>
+            <a:endParaRPr lang="en-US" dirty="0" smtClean="0"/>
           </a:p>
         </p:txBody>
       </p:sp>
@@ -11838,8 +12093,8 @@
           <a:lstStyle/>
           <a:p>
             <a:r>
-              <a:rPr lang="ru-RU" dirty="0" smtClean="0"/>
-              <a:t>Регрессия — переоценена!</a:t>
+              <a:rPr lang="en-US" dirty="0" smtClean="0"/>
+              <a:t>Integration vs Unit</a:t>
             </a:r>
             <a:endParaRPr lang="ru-RU" dirty="0"/>
           </a:p>
@@ -11848,7 +12103,7 @@
     </p:spTree>
     <p:extLst>
       <p:ext uri="{BB962C8B-B14F-4D97-AF65-F5344CB8AC3E}">
-        <p14:creationId xmlns:p14="http://schemas.microsoft.com/office/powerpoint/2010/main" val="4191607681"/>
+        <p14:creationId xmlns:p14="http://schemas.microsoft.com/office/powerpoint/2010/main" val="677875832"/>
       </p:ext>
     </p:extLst>
   </p:cSld>
@@ -11892,9 +12147,116 @@
             <p:ph sz="quarter" idx="13"/>
           </p:nvPr>
         </p:nvSpPr>
+        <p:spPr/>
+        <p:txBody>
+          <a:bodyPr/>
+          <a:lstStyle/>
+          <a:p>
+            <a:pPr marL="342900" indent="-342900">
+              <a:buFont typeface="Arial" panose="020B0604020202020204" pitchFamily="34" charset="0"/>
+              <a:buChar char="•"/>
+            </a:pPr>
+            <a:r>
+              <a:rPr lang="ru-RU" dirty="0" smtClean="0"/>
+              <a:t>Баги возникают при разработке и рефакторинге</a:t>
+            </a:r>
+          </a:p>
+          <a:p>
+            <a:pPr marL="342900" indent="-342900">
+              <a:buFont typeface="Arial" panose="020B0604020202020204" pitchFamily="34" charset="0"/>
+              <a:buChar char="•"/>
+            </a:pPr>
+            <a:r>
+              <a:rPr lang="ru-RU" dirty="0" smtClean="0"/>
+              <a:t>После — крайне редко.</a:t>
+            </a:r>
+            <a:endParaRPr lang="ru-RU" dirty="0"/>
+          </a:p>
+          <a:p>
+            <a:pPr marL="342900" indent="-342900">
+              <a:buFont typeface="Arial" panose="020B0604020202020204" pitchFamily="34" charset="0"/>
+              <a:buChar char="•"/>
+            </a:pPr>
+            <a:r>
+              <a:rPr lang="ru-RU" dirty="0" smtClean="0"/>
+              <a:t>Тесты, созданные после окончания разработки — почти бесполезны.</a:t>
+            </a:r>
+          </a:p>
+        </p:txBody>
+      </p:sp>
+      <p:sp>
+        <p:nvSpPr>
+          <p:cNvPr id="3" name="Заголовок 2"/>
+          <p:cNvSpPr>
+            <a:spLocks noGrp="1"/>
+          </p:cNvSpPr>
+          <p:nvPr>
+            <p:ph type="title"/>
+          </p:nvPr>
+        </p:nvSpPr>
+        <p:spPr/>
+        <p:txBody>
+          <a:bodyPr/>
+          <a:lstStyle/>
+          <a:p>
+            <a:r>
+              <a:rPr lang="ru-RU" dirty="0" smtClean="0"/>
+              <a:t>Регрессия — переоценена!</a:t>
+            </a:r>
+            <a:endParaRPr lang="ru-RU" dirty="0"/>
+          </a:p>
+        </p:txBody>
+      </p:sp>
+    </p:spTree>
+    <p:extLst>
+      <p:ext uri="{BB962C8B-B14F-4D97-AF65-F5344CB8AC3E}">
+        <p14:creationId xmlns:p14="http://schemas.microsoft.com/office/powerpoint/2010/main" val="4191607681"/>
+      </p:ext>
+    </p:extLst>
+  </p:cSld>
+  <p:clrMapOvr>
+    <a:masterClrMapping/>
+  </p:clrMapOvr>
+  <p:timing>
+    <p:tnLst>
+      <p:par>
+        <p:cTn id="1" dur="indefinite" restart="never" nodeType="tmRoot"/>
+      </p:par>
+    </p:tnLst>
+  </p:timing>
+</p:sld>
+</file>
+
+<file path=ppt/slides/slide14.xml><?xml version="1.0" encoding="utf-8"?>
+<p:sld xmlns:a="http://schemas.openxmlformats.org/drawingml/2006/main" xmlns:r="http://schemas.openxmlformats.org/officeDocument/2006/relationships" xmlns:p="http://schemas.openxmlformats.org/presentationml/2006/main">
+  <p:cSld>
+    <p:spTree>
+      <p:nvGrpSpPr>
+        <p:cNvPr id="1" name=""/>
+        <p:cNvGrpSpPr/>
+        <p:nvPr/>
+      </p:nvGrpSpPr>
+      <p:grpSpPr>
+        <a:xfrm>
+          <a:off x="0" y="0"/>
+          <a:ext cx="0" cy="0"/>
+          <a:chOff x="0" y="0"/>
+          <a:chExt cx="0" cy="0"/>
+        </a:xfrm>
+      </p:grpSpPr>
+      <p:sp>
+        <p:nvSpPr>
+          <p:cNvPr id="2" name="Объект 1"/>
+          <p:cNvSpPr>
+            <a:spLocks noGrp="1"/>
+          </p:cNvSpPr>
+          <p:nvPr>
+            <p:ph sz="quarter" idx="13"/>
+          </p:nvPr>
+        </p:nvSpPr>
         <p:spPr>
           <a:xfrm>
-            <a:off x="971550" y="1628779"/>
+            <a:off x="2495550" y="1628780"/>
             <a:ext cx="7848922" cy="4679951"/>
           </a:xfrm>
         </p:spPr>
@@ -12643,7 +13005,7 @@
         </p:nvSpPr>
         <p:spPr>
           <a:xfrm>
-            <a:off x="971602" y="1269207"/>
+            <a:off x="2495602" y="1269207"/>
             <a:ext cx="7200800" cy="1025666"/>
           </a:xfrm>
         </p:spPr>
@@ -12683,7 +13045,7 @@
         </p:blipFill>
         <p:spPr>
           <a:xfrm>
-            <a:off x="3109516" y="2294873"/>
+            <a:off x="4633517" y="2294874"/>
             <a:ext cx="2924969" cy="3293921"/>
           </a:xfrm>
           <a:prstGeom prst="ellipse">
@@ -14038,33 +14400,19 @@
           <a:bodyPr/>
           <a:lstStyle/>
           <a:p>
+            <a:r>
+              <a:rPr lang="ru-RU" dirty="0" smtClean="0"/>
+              <a:t>В том же проекте — удобнее, но:</a:t>
+            </a:r>
+          </a:p>
+          <a:p>
             <a:pPr marL="457200" indent="-457200">
               <a:buAutoNum type="arabicPeriod"/>
             </a:pPr>
             <a:r>
               <a:rPr lang="ru-RU" dirty="0" smtClean="0"/>
-              <a:t>Тест должен быть понятным! </a:t>
-            </a:r>
-            <a:r>
-              <a:rPr lang="en-US" dirty="0" smtClean="0"/>
-              <a:t/>
-            </a:r>
-            <a:br>
-              <a:rPr lang="en-US" dirty="0" smtClean="0"/>
-            </a:br>
-            <a:r>
-              <a:rPr lang="en-US" dirty="0" smtClean="0"/>
-              <a:t>DAMP</a:t>
-            </a:r>
-            <a:r>
-              <a:rPr lang="ru-RU" dirty="0" smtClean="0"/>
-              <a:t> — </a:t>
-            </a:r>
-            <a:r>
-              <a:rPr lang="en-US" dirty="0" smtClean="0"/>
-              <a:t>descriptive and meaningful phrases.</a:t>
-            </a:r>
-            <a:endParaRPr lang="ru-RU" dirty="0"/>
+              <a:t>Лишние файлы и тестовые данные.</a:t>
+            </a:r>
           </a:p>
           <a:p>
             <a:pPr marL="457200" indent="-457200">
@@ -14072,18 +14420,12 @@
             </a:pPr>
             <a:r>
               <a:rPr lang="ru-RU" dirty="0" smtClean="0"/>
-              <a:t>Дублирование приводит к хрупкости. Нужно </a:t>
-            </a:r>
-            <a:r>
-              <a:rPr lang="ru-RU" dirty="0" err="1" smtClean="0"/>
-              <a:t>рефакторить</a:t>
-            </a:r>
-            <a:r>
-              <a:rPr lang="ru-RU" dirty="0" smtClean="0"/>
-              <a:t>.</a:t>
-            </a:r>
-          </a:p>
-          <a:p>
+              <a:t>Лишние зависимости, возможно</a:t>
+            </a:r>
+            <a:r>
+              <a:rPr lang="ru-RU" smtClean="0"/>
+              <a:t>, конфликтующие.</a:t>
+            </a:r>
             <a:endParaRPr lang="ru-RU" dirty="0"/>
           </a:p>
         </p:txBody>
@@ -14104,12 +14446,8 @@
           <a:lstStyle/>
           <a:p>
             <a:r>
-              <a:rPr lang="en-US" dirty="0" smtClean="0"/>
-              <a:t>DRY</a:t>
-            </a:r>
-            <a:r>
               <a:rPr lang="ru-RU" dirty="0" smtClean="0"/>
-              <a:t> в тестах?</a:t>
+              <a:t>В том же проекте или в отдельном?</a:t>
             </a:r>
             <a:endParaRPr lang="ru-RU" dirty="0"/>
           </a:p>
@@ -14118,20 +14456,13 @@
     </p:spTree>
     <p:extLst>
       <p:ext uri="{BB962C8B-B14F-4D97-AF65-F5344CB8AC3E}">
-        <p14:creationId xmlns:p14="http://schemas.microsoft.com/office/powerpoint/2010/main" val="3189334414"/>
+        <p14:creationId xmlns:p14="http://schemas.microsoft.com/office/powerpoint/2010/main" val="3313076944"/>
       </p:ext>
     </p:extLst>
   </p:cSld>
   <p:clrMapOvr>
     <a:masterClrMapping/>
   </p:clrMapOvr>
-  <p:timing>
-    <p:tnLst>
-      <p:par>
-        <p:cTn id="1" dur="indefinite" restart="never" nodeType="tmRoot"/>
-      </p:par>
-    </p:tnLst>
-  </p:timing>
 </p:sld>
 </file>
 

</xml_diff>